<commit_message>
Update A simple 2D scroll game.pptx
</commit_message>
<xml_diff>
--- a/A simple 2D scroll game.pptx
+++ b/A simple 2D scroll game.pptx
@@ -6645,10 +6645,15 @@
             <p:ph idx="1"/>
           </p:nvPr>
         </p:nvSpPr>
-        <p:spPr/>
+        <p:spPr>
+          <a:xfrm>
+            <a:off x="677334" y="2160589"/>
+            <a:ext cx="8596668" cy="4332490"/>
+          </a:xfrm>
+        </p:spPr>
         <p:txBody>
           <a:bodyPr>
-            <a:normAutofit fontScale="85000" lnSpcReduction="10000"/>
+            <a:normAutofit fontScale="92500" lnSpcReduction="20000"/>
           </a:bodyPr>
           <a:lstStyle/>
           <a:p>
@@ -6765,6 +6770,26 @@
               <a:rPr lang="ja-JP" altLang="en-US" dirty="0"/>
               <a:t>移動システムについて、特殊地面（スロープ、狭い道など）に対してまだ最適化ができるところがあります。</a:t>
             </a:r>
+            <a:endParaRPr lang="en-US" altLang="ja-JP" dirty="0"/>
+          </a:p>
+          <a:p>
+            <a:pPr lvl="1">
+              <a:lnSpc>
+                <a:spcPct val="150000"/>
+              </a:lnSpc>
+            </a:pPr>
+            <a:r>
+              <a:rPr lang="ja-JP" altLang="en-US" dirty="0"/>
+              <a:t>ジャンプの時にしゃがむすることができないことを修正したい。</a:t>
+            </a:r>
+            <a:endParaRPr lang="en-US" altLang="ja-JP" dirty="0"/>
+          </a:p>
+          <a:p>
+            <a:pPr lvl="1">
+              <a:lnSpc>
+                <a:spcPct val="150000"/>
+              </a:lnSpc>
+            </a:pPr>
             <a:endParaRPr lang="zh-CN" altLang="en-US" dirty="0"/>
           </a:p>
         </p:txBody>

</xml_diff>